<commit_message>
finished my slides for the powerpoint
</commit_message>
<xml_diff>
--- a/JackPowerPoint.pptx
+++ b/JackPowerPoint.pptx
@@ -6,6 +6,7 @@
   </p:sldMasterIdLst>
   <p:sldIdLst>
     <p:sldId id="256" r:id="rId2"/>
+    <p:sldId id="257" r:id="rId3"/>
   </p:sldIdLst>
   <p:sldSz cx="12192000" cy="6858000"/>
   <p:notesSz cx="6858000" cy="9144000"/>
@@ -104,6 +105,11 @@
       </a:defRPr>
     </a:lvl9pPr>
   </p:defaultTextStyle>
+  <p:extLst>
+    <p:ext uri="{EFAFB233-063F-42B5-8137-9DF3F51BA10A}">
+      <p15:sldGuideLst xmlns:p15="http://schemas.microsoft.com/office/powerpoint/2012/main"/>
+    </p:ext>
+  </p:extLst>
 </p:presentation>
 </file>
 
@@ -5809,45 +5815,339 @@
           <a:p>
             <a:r>
               <a:rPr lang="en-IE" dirty="0"/>
-              <a:t>The races will take place in a variety of places such as the rings </a:t>
-            </a:r>
-            <a:r>
-              <a:rPr lang="en-IE"/>
-              <a:t>of Saturn </a:t>
-            </a:r>
-            <a:endParaRPr lang="en-IE" dirty="0"/>
-          </a:p>
-        </p:txBody>
-      </p:sp>
-      <p:sp>
-        <p:nvSpPr>
-          <p:cNvPr id="6" name="Content Placeholder 5">
+              <a:t>The races will take place in a variety of places such as the rings of Saturn </a:t>
+            </a:r>
+          </a:p>
+          <a:p>
+            <a:r>
+              <a:rPr lang="en-IE" dirty="0"/>
+              <a:t>The game world will be an immersive place with interesting space scenery</a:t>
+            </a:r>
+          </a:p>
+        </p:txBody>
+      </p:sp>
+      <p:pic>
+        <p:nvPicPr>
+          <p:cNvPr id="3" name="Content Placeholder 2">
             <a:extLst>
               <a:ext uri="{FF2B5EF4-FFF2-40B4-BE49-F238E27FC236}">
-                <a16:creationId xmlns:a16="http://schemas.microsoft.com/office/drawing/2014/main" id="{86573F08-8082-46BC-B74F-550A073D34BB}"/>
+                <a16:creationId xmlns:a16="http://schemas.microsoft.com/office/drawing/2014/main" id="{C890B682-A3CC-44B3-85FE-5E66D86576AD}"/>
               </a:ext>
             </a:extLst>
           </p:cNvPr>
-          <p:cNvSpPr>
-            <a:spLocks noGrp="1"/>
-          </p:cNvSpPr>
+          <p:cNvPicPr>
+            <a:picLocks noGrp="1" noChangeAspect="1"/>
+          </p:cNvPicPr>
           <p:nvPr>
             <p:ph sz="half" idx="2"/>
           </p:nvPr>
-        </p:nvSpPr>
-        <p:spPr/>
-        <p:txBody>
-          <a:bodyPr/>
-          <a:lstStyle/>
-          <a:p>
-            <a:endParaRPr lang="en-IE"/>
-          </a:p>
-        </p:txBody>
-      </p:sp>
+        </p:nvPicPr>
+        <p:blipFill>
+          <a:blip r:embed="rId2">
+            <a:extLst>
+              <a:ext uri="{28A0092B-C50C-407E-A947-70E740481C1C}">
+                <a14:useLocalDpi xmlns:a14="http://schemas.microsoft.com/office/drawing/2010/main" val="0"/>
+              </a:ext>
+            </a:extLst>
+          </a:blip>
+          <a:stretch>
+            <a:fillRect/>
+          </a:stretch>
+        </p:blipFill>
+        <p:spPr>
+          <a:xfrm>
+            <a:off x="7164927" y="2057401"/>
+            <a:ext cx="2431834" cy="1185300"/>
+          </a:xfrm>
+        </p:spPr>
+      </p:pic>
+      <p:pic>
+        <p:nvPicPr>
+          <p:cNvPr id="8" name="Picture 7">
+            <a:extLst>
+              <a:ext uri="{FF2B5EF4-FFF2-40B4-BE49-F238E27FC236}">
+                <a16:creationId xmlns:a16="http://schemas.microsoft.com/office/drawing/2014/main" id="{33487FF4-181A-4D84-A0EE-CA8DE687F0AE}"/>
+              </a:ext>
+            </a:extLst>
+          </p:cNvPr>
+          <p:cNvPicPr>
+            <a:picLocks noChangeAspect="1"/>
+          </p:cNvPicPr>
+          <p:nvPr/>
+        </p:nvPicPr>
+        <p:blipFill>
+          <a:blip r:embed="rId3">
+            <a:extLst>
+              <a:ext uri="{28A0092B-C50C-407E-A947-70E740481C1C}">
+                <a14:useLocalDpi xmlns:a14="http://schemas.microsoft.com/office/drawing/2010/main" val="0"/>
+              </a:ext>
+            </a:extLst>
+          </a:blip>
+          <a:stretch>
+            <a:fillRect/>
+          </a:stretch>
+        </p:blipFill>
+        <p:spPr>
+          <a:xfrm>
+            <a:off x="9230788" y="2057401"/>
+            <a:ext cx="2847975" cy="1600200"/>
+          </a:xfrm>
+          <a:prstGeom prst="rect">
+            <a:avLst/>
+          </a:prstGeom>
+        </p:spPr>
+      </p:pic>
+      <p:pic>
+        <p:nvPicPr>
+          <p:cNvPr id="10" name="Picture 9">
+            <a:extLst>
+              <a:ext uri="{FF2B5EF4-FFF2-40B4-BE49-F238E27FC236}">
+                <a16:creationId xmlns:a16="http://schemas.microsoft.com/office/drawing/2014/main" id="{4FF457D6-044F-4783-ACCE-F325822EB30F}"/>
+              </a:ext>
+            </a:extLst>
+          </p:cNvPr>
+          <p:cNvPicPr>
+            <a:picLocks noChangeAspect="1"/>
+          </p:cNvPicPr>
+          <p:nvPr/>
+        </p:nvPicPr>
+        <p:blipFill>
+          <a:blip r:embed="rId4">
+            <a:extLst>
+              <a:ext uri="{28A0092B-C50C-407E-A947-70E740481C1C}">
+                <a14:useLocalDpi xmlns:a14="http://schemas.microsoft.com/office/drawing/2010/main" val="0"/>
+              </a:ext>
+            </a:extLst>
+          </a:blip>
+          <a:stretch>
+            <a:fillRect/>
+          </a:stretch>
+        </p:blipFill>
+        <p:spPr>
+          <a:xfrm>
+            <a:off x="7164927" y="3950502"/>
+            <a:ext cx="2143125" cy="2143125"/>
+          </a:xfrm>
+          <a:prstGeom prst="rect">
+            <a:avLst/>
+          </a:prstGeom>
+        </p:spPr>
+      </p:pic>
+      <p:pic>
+        <p:nvPicPr>
+          <p:cNvPr id="12" name="Picture 11">
+            <a:extLst>
+              <a:ext uri="{FF2B5EF4-FFF2-40B4-BE49-F238E27FC236}">
+                <a16:creationId xmlns:a16="http://schemas.microsoft.com/office/drawing/2014/main" id="{E994D043-9FFE-40B9-B936-F38B059A0BA4}"/>
+              </a:ext>
+            </a:extLst>
+          </p:cNvPr>
+          <p:cNvPicPr>
+            <a:picLocks noChangeAspect="1"/>
+          </p:cNvPicPr>
+          <p:nvPr/>
+        </p:nvPicPr>
+        <p:blipFill>
+          <a:blip r:embed="rId5">
+            <a:extLst>
+              <a:ext uri="{28A0092B-C50C-407E-A947-70E740481C1C}">
+                <a14:useLocalDpi xmlns:a14="http://schemas.microsoft.com/office/drawing/2010/main" val="0"/>
+              </a:ext>
+            </a:extLst>
+          </a:blip>
+          <a:stretch>
+            <a:fillRect/>
+          </a:stretch>
+        </p:blipFill>
+        <p:spPr>
+          <a:xfrm>
+            <a:off x="9499477" y="4155706"/>
+            <a:ext cx="2514600" cy="1819275"/>
+          </a:xfrm>
+          <a:prstGeom prst="rect">
+            <a:avLst/>
+          </a:prstGeom>
+        </p:spPr>
+      </p:pic>
     </p:spTree>
     <p:extLst>
       <p:ext uri="{BB962C8B-B14F-4D97-AF65-F5344CB8AC3E}">
         <p14:creationId xmlns:p14="http://schemas.microsoft.com/office/powerpoint/2010/main" val="994629126"/>
+      </p:ext>
+    </p:extLst>
+  </p:cSld>
+  <p:clrMapOvr>
+    <a:masterClrMapping/>
+  </p:clrMapOvr>
+</p:sld>
+</file>
+
+<file path=ppt/slides/slide2.xml><?xml version="1.0" encoding="utf-8"?>
+<p:sld xmlns:a="http://schemas.openxmlformats.org/drawingml/2006/main" xmlns:r="http://schemas.openxmlformats.org/officeDocument/2006/relationships" xmlns:p="http://schemas.openxmlformats.org/presentationml/2006/main">
+  <p:cSld>
+    <p:spTree>
+      <p:nvGrpSpPr>
+        <p:cNvPr id="1" name=""/>
+        <p:cNvGrpSpPr/>
+        <p:nvPr/>
+      </p:nvGrpSpPr>
+      <p:grpSpPr>
+        <a:xfrm>
+          <a:off x="0" y="0"/>
+          <a:ext cx="0" cy="0"/>
+          <a:chOff x="0" y="0"/>
+          <a:chExt cx="0" cy="0"/>
+        </a:xfrm>
+      </p:grpSpPr>
+      <p:sp>
+        <p:nvSpPr>
+          <p:cNvPr id="2" name="Title 1">
+            <a:extLst>
+              <a:ext uri="{FF2B5EF4-FFF2-40B4-BE49-F238E27FC236}">
+                <a16:creationId xmlns:a16="http://schemas.microsoft.com/office/drawing/2014/main" id="{E008FC6C-1C78-49E0-93B2-BE0E1543CF67}"/>
+              </a:ext>
+            </a:extLst>
+          </p:cNvPr>
+          <p:cNvSpPr>
+            <a:spLocks noGrp="1"/>
+          </p:cNvSpPr>
+          <p:nvPr>
+            <p:ph type="title"/>
+          </p:nvPr>
+        </p:nvSpPr>
+        <p:spPr>
+          <a:xfrm>
+            <a:off x="685800" y="764373"/>
+            <a:ext cx="10820400" cy="1293028"/>
+          </a:xfrm>
+        </p:spPr>
+        <p:txBody>
+          <a:bodyPr/>
+          <a:lstStyle/>
+          <a:p>
+            <a:pPr algn="l"/>
+            <a:r>
+              <a:rPr lang="en-IE" dirty="0"/>
+              <a:t>Gameplay Description</a:t>
+            </a:r>
+          </a:p>
+        </p:txBody>
+      </p:sp>
+      <p:sp>
+        <p:nvSpPr>
+          <p:cNvPr id="3" name="Content Placeholder 2">
+            <a:extLst>
+              <a:ext uri="{FF2B5EF4-FFF2-40B4-BE49-F238E27FC236}">
+                <a16:creationId xmlns:a16="http://schemas.microsoft.com/office/drawing/2014/main" id="{4D503773-4AA6-489D-9A3F-1964BA37F7D6}"/>
+              </a:ext>
+            </a:extLst>
+          </p:cNvPr>
+          <p:cNvSpPr>
+            <a:spLocks noGrp="1"/>
+          </p:cNvSpPr>
+          <p:nvPr>
+            <p:ph sz="half" idx="1"/>
+          </p:nvPr>
+        </p:nvSpPr>
+        <p:spPr/>
+        <p:txBody>
+          <a:bodyPr/>
+          <a:lstStyle/>
+          <a:p>
+            <a:r>
+              <a:rPr lang="en-IE" dirty="0"/>
+              <a:t>The game will be a fun arcade racer with good use of gravity to counteract the slower speed of the lawnmowers to create a learning curb of the game</a:t>
+            </a:r>
+          </a:p>
+          <a:p>
+            <a:r>
+              <a:rPr lang="en-IE" dirty="0"/>
+              <a:t>The gameplay will feel quite floaty due to the use of gravity in the game </a:t>
+            </a:r>
+          </a:p>
+          <a:p>
+            <a:r>
+              <a:rPr lang="en-IE" dirty="0"/>
+              <a:t>The game will be satisfying to play when winning but frustrating when losing </a:t>
+            </a:r>
+          </a:p>
+        </p:txBody>
+      </p:sp>
+      <p:pic>
+        <p:nvPicPr>
+          <p:cNvPr id="6" name="Content Placeholder 5">
+            <a:extLst>
+              <a:ext uri="{FF2B5EF4-FFF2-40B4-BE49-F238E27FC236}">
+                <a16:creationId xmlns:a16="http://schemas.microsoft.com/office/drawing/2014/main" id="{14FC58DE-5FAE-4D67-8184-F12115133193}"/>
+              </a:ext>
+            </a:extLst>
+          </p:cNvPr>
+          <p:cNvPicPr>
+            <a:picLocks noGrp="1" noChangeAspect="1"/>
+          </p:cNvPicPr>
+          <p:nvPr>
+            <p:ph sz="half" idx="2"/>
+          </p:nvPr>
+        </p:nvPicPr>
+        <p:blipFill>
+          <a:blip r:embed="rId2">
+            <a:extLst>
+              <a:ext uri="{28A0092B-C50C-407E-A947-70E740481C1C}">
+                <a14:useLocalDpi xmlns:a14="http://schemas.microsoft.com/office/drawing/2010/main" val="0"/>
+              </a:ext>
+            </a:extLst>
+          </a:blip>
+          <a:stretch>
+            <a:fillRect/>
+          </a:stretch>
+        </p:blipFill>
+        <p:spPr>
+          <a:xfrm>
+            <a:off x="6984322" y="1896777"/>
+            <a:ext cx="2857500" cy="1600200"/>
+          </a:xfrm>
+        </p:spPr>
+      </p:pic>
+      <p:pic>
+        <p:nvPicPr>
+          <p:cNvPr id="8" name="Picture 7">
+            <a:extLst>
+              <a:ext uri="{FF2B5EF4-FFF2-40B4-BE49-F238E27FC236}">
+                <a16:creationId xmlns:a16="http://schemas.microsoft.com/office/drawing/2014/main" id="{06B02989-E74F-423E-8820-F6C7C025517E}"/>
+              </a:ext>
+            </a:extLst>
+          </p:cNvPr>
+          <p:cNvPicPr>
+            <a:picLocks noChangeAspect="1"/>
+          </p:cNvPicPr>
+          <p:nvPr/>
+        </p:nvPicPr>
+        <p:blipFill>
+          <a:blip r:embed="rId3">
+            <a:extLst>
+              <a:ext uri="{28A0092B-C50C-407E-A947-70E740481C1C}">
+                <a14:useLocalDpi xmlns:a14="http://schemas.microsoft.com/office/drawing/2010/main" val="0"/>
+              </a:ext>
+            </a:extLst>
+          </a:blip>
+          <a:stretch>
+            <a:fillRect/>
+          </a:stretch>
+        </p:blipFill>
+        <p:spPr>
+          <a:xfrm>
+            <a:off x="8300991" y="4064077"/>
+            <a:ext cx="2514600" cy="1819275"/>
+          </a:xfrm>
+          <a:prstGeom prst="rect">
+            <a:avLst/>
+          </a:prstGeom>
+        </p:spPr>
+      </p:pic>
+    </p:spTree>
+    <p:extLst>
+      <p:ext uri="{BB962C8B-B14F-4D97-AF65-F5344CB8AC3E}">
+        <p14:creationId xmlns:p14="http://schemas.microsoft.com/office/powerpoint/2010/main" val="3813829192"/>
       </p:ext>
     </p:extLst>
   </p:cSld>

</xml_diff>